<commit_message>
References updated need to update literature survey.
</commit_message>
<xml_diff>
--- a/bhavana-522/Batch-A1-2024(2).pptx
+++ b/bhavana-522/Batch-A1-2024(2).pptx
@@ -13478,13 +13478,14 @@
           </a:bodyPr>
           <a:lstStyle/>
           <a:p>
-            <a:pPr marL="577800" indent="-577800" algn="just">
+            <a:pPr marL="0" indent="0" algn="just">
               <a:lnSpc>
                 <a:spcPts val="3700"/>
               </a:lnSpc>
               <a:spcBef>
                 <a:spcPts val="1001"/>
               </a:spcBef>
+              <a:buNone/>
               <a:tabLst>
                 <a:tab pos="0" algn="l"/>
               </a:tabLst>
@@ -13567,13 +13568,14 @@
             </a:endParaRPr>
           </a:p>
           <a:p>
-            <a:pPr marL="577800" indent="-577800" algn="just">
+            <a:pPr marL="0" indent="0" algn="just">
               <a:lnSpc>
                 <a:spcPct val="90000"/>
               </a:lnSpc>
               <a:spcBef>
                 <a:spcPts val="1001"/>
               </a:spcBef>
+              <a:buNone/>
               <a:tabLst>
                 <a:tab pos="0" algn="l"/>
               </a:tabLst>
@@ -14259,7 +14261,7 @@
               </a:spcBef>
             </a:pPr>
             <a:r>
-              <a:rPr lang="en-US" sz="2800" b="0" strike="noStrike" spc="-1" dirty="0">
+              <a:rPr lang="en-US" b="0" strike="noStrike" spc="-1" dirty="0">
                 <a:solidFill>
                   <a:schemeClr val="bg1"/>
                 </a:solidFill>
@@ -14267,7 +14269,7 @@
               </a:rPr>
               <a:t>Abstract</a:t>
             </a:r>
-            <a:endParaRPr lang="en-US" sz="2800" b="0" strike="noStrike" spc="-1" dirty="0">
+            <a:endParaRPr lang="en-US" b="0" strike="noStrike" spc="-1" dirty="0">
               <a:solidFill>
                 <a:schemeClr val="bg1"/>
               </a:solidFill>
@@ -14493,7 +14495,7 @@
               </a:lnSpc>
             </a:pPr>
             <a:r>
-              <a:rPr lang="en-US" sz="4400" b="0" strike="noStrike" spc="-1">
+              <a:rPr lang="en-US" sz="4400" b="0" strike="noStrike" spc="-1" dirty="0">
                 <a:solidFill>
                   <a:srgbClr val="FFFFFF"/>
                 </a:solidFill>
@@ -14501,7 +14503,7 @@
               </a:rPr>
               <a:t>Problem Statement</a:t>
             </a:r>
-            <a:endParaRPr lang="en-US" sz="4400" b="0" strike="noStrike" spc="-1">
+            <a:endParaRPr lang="en-US" sz="4400" b="0" strike="noStrike" spc="-1" dirty="0">
               <a:solidFill>
                 <a:srgbClr val="000000"/>
               </a:solidFill>
@@ -14540,8 +14542,9 @@
           <a:lstStyle/>
           <a:p>
             <a:pPr>
-              <a:buFont typeface="Wingdings" panose="05000000000000000000" pitchFamily="2" charset="2"/>
-              <a:buChar char="Ø"/>
+              <a:lnSpc>
+                <a:spcPct val="100000"/>
+              </a:lnSpc>
             </a:pPr>
             <a:r>
               <a:rPr lang="en-GB" dirty="0">
@@ -14553,8 +14556,9 @@
           </a:p>
           <a:p>
             <a:pPr>
-              <a:buFont typeface="Wingdings" panose="05000000000000000000" pitchFamily="2" charset="2"/>
-              <a:buChar char="Ø"/>
+              <a:lnSpc>
+                <a:spcPct val="100000"/>
+              </a:lnSpc>
             </a:pPr>
             <a:r>
               <a:rPr lang="en-GB" b="0" i="0" dirty="0">
@@ -14570,8 +14574,9 @@
           </a:p>
           <a:p>
             <a:pPr>
-              <a:buFont typeface="Wingdings" panose="05000000000000000000" pitchFamily="2" charset="2"/>
-              <a:buChar char="Ø"/>
+              <a:lnSpc>
+                <a:spcPct val="100000"/>
+              </a:lnSpc>
             </a:pPr>
             <a:r>
               <a:rPr lang="en-GB" dirty="0">
@@ -14600,7 +14605,7 @@
                 <a:cs typeface="Times New Roman" panose="02020603050405020304" pitchFamily="18" charset="0"/>
               </a:rPr>
             </a:br>
-            <a:endParaRPr lang="en-US" sz="2800" b="0" strike="noStrike" spc="-1" dirty="0">
+            <a:endParaRPr lang="en-US" b="0" strike="noStrike" spc="-1" dirty="0">
               <a:solidFill>
                 <a:srgbClr val="000000"/>
               </a:solidFill>
@@ -14727,7 +14732,7 @@
           <a:p>
             <a:pPr algn="just">
               <a:lnSpc>
-                <a:spcPts val="3700"/>
+                <a:spcPct val="100000"/>
               </a:lnSpc>
               <a:spcBef>
                 <a:spcPts val="1001"/>
@@ -14749,7 +14754,7 @@
           <a:p>
             <a:pPr algn="just">
               <a:lnSpc>
-                <a:spcPts val="3700"/>
+                <a:spcPct val="100000"/>
               </a:lnSpc>
               <a:spcBef>
                 <a:spcPts val="1001"/>
@@ -15461,13 +15466,14 @@
           </a:bodyPr>
           <a:lstStyle/>
           <a:p>
-            <a:pPr marL="577800" indent="-577800" algn="just">
+            <a:pPr marL="0" indent="0" algn="just">
               <a:lnSpc>
                 <a:spcPts val="3700"/>
               </a:lnSpc>
               <a:spcBef>
                 <a:spcPts val="1001"/>
               </a:spcBef>
+              <a:buNone/>
               <a:tabLst>
                 <a:tab pos="0" algn="l"/>
               </a:tabLst>
@@ -15479,7 +15485,7 @@
                 </a:solidFill>
                 <a:latin typeface="Times New Roman"/>
               </a:rPr>
-              <a:t>[1].Mustafa </a:t>
+              <a:t>[1] Mustafa </a:t>
             </a:r>
             <a:r>
               <a:rPr lang="en-US" sz="2800" b="0" strike="noStrike" spc="-1" dirty="0" err="1">
@@ -15545,7 +15551,7 @@
                 <a:cs typeface="Times New Roman" panose="02020603050405020304" pitchFamily="18" charset="0"/>
                 <a:hlinkClick r:id="rId2" action="ppaction://hlinkpres?slideindex=1&amp;slidetitle="/>
               </a:rPr>
-              <a:t>“Security Improvement of Cloud Data Using Hybrid Cryptography and Steganography”</a:t>
+              <a:t>“Security Improvement     of Cloud Data Using Hybrid Cryptography and Steganography”</a:t>
             </a:r>
             <a:r>
               <a:rPr lang="en-US" dirty="0">
@@ -15556,13 +15562,14 @@
             </a:r>
           </a:p>
           <a:p>
-            <a:pPr marL="577800" indent="-577800" algn="just">
+            <a:pPr marL="0" indent="0" algn="just">
               <a:lnSpc>
                 <a:spcPts val="3700"/>
               </a:lnSpc>
               <a:spcBef>
                 <a:spcPts val="1001"/>
               </a:spcBef>
+              <a:buNone/>
               <a:tabLst>
                 <a:tab pos="0" algn="l"/>
               </a:tabLst>
@@ -15574,7 +15581,7 @@
                 </a:solidFill>
                 <a:latin typeface="Times New Roman"/>
               </a:rPr>
-              <a:t>[2]. </a:t>
+              <a:t>[2] </a:t>
             </a:r>
             <a:r>
               <a:rPr lang="en-IN" dirty="0">
@@ -15656,13 +15663,14 @@
             </a:endParaRPr>
           </a:p>
           <a:p>
-            <a:pPr marL="577800" indent="-577800" algn="just">
+            <a:pPr marL="0" indent="0" algn="just">
               <a:lnSpc>
                 <a:spcPts val="3700"/>
               </a:lnSpc>
               <a:spcBef>
                 <a:spcPts val="1001"/>
               </a:spcBef>
+              <a:buNone/>
               <a:tabLst>
                 <a:tab pos="0" algn="l"/>
               </a:tabLst>
@@ -15672,7 +15680,7 @@
                 <a:latin typeface="Times New Roman" panose="02020603050405020304" pitchFamily="18" charset="0"/>
                 <a:cs typeface="Times New Roman" panose="02020603050405020304" pitchFamily="18" charset="0"/>
               </a:rPr>
-              <a:t>[3]. </a:t>
+              <a:t>[3]  </a:t>
             </a:r>
             <a:r>
               <a:rPr lang="en-IN" dirty="0" err="1">

</xml_diff>